<commit_message>
Edited week 1 object notes
</commit_message>
<xml_diff>
--- a/Week_1_variables_operators_and_algorithms/Seminar_algorithms/seminar1_algorithms.pptx
+++ b/Week_1_variables_operators_and_algorithms/Seminar_algorithms/seminar1_algorithms.pptx
@@ -141,6 +141,11 @@
       </a:defRPr>
     </a:lvl9pPr>
   </p:defaultTextStyle>
+  <p:extLst>
+    <p:ext uri="{EFAFB233-063F-42B5-8137-9DF3F51BA10A}">
+      <p15:sldGuideLst xmlns:p15="http://schemas.microsoft.com/office/powerpoint/2012/main"/>
+    </p:ext>
+  </p:extLst>
 </p:presentation>
 </file>
 
@@ -150,6 +155,35 @@
     <p1510:client id="{7F7E35A6-1589-9547-9539-0C50FDBE5FEE}" v="1" dt="2025-08-04T13:21:49.044"/>
   </p1510:revLst>
 </p1510:revInfo>
+</file>
+
+<file path=ppt/changesInfos/changesInfo1.xml><?xml version="1.0" encoding="utf-8"?>
+<pc:chgInfo xmlns:a="http://schemas.openxmlformats.org/drawingml/2006/main" xmlns:r="http://schemas.openxmlformats.org/officeDocument/2006/relationships" xmlns:ac="http://schemas.microsoft.com/office/drawing/2013/main/command" xmlns:pc="http://schemas.microsoft.com/office/powerpoint/2013/main/command">
+  <pc:docChgLst>
+    <pc:chgData name="Martin Garrad" userId="29fa8137-b5d4-4adf-94e3-55aca812c4da" providerId="ADAL" clId="{7F7E35A6-1589-9547-9539-0C50FDBE5FEE}"/>
+    <pc:docChg chg="modSld">
+      <pc:chgData name="Martin Garrad" userId="29fa8137-b5d4-4adf-94e3-55aca812c4da" providerId="ADAL" clId="{7F7E35A6-1589-9547-9539-0C50FDBE5FEE}" dt="2025-08-11T13:05:20.700" v="15" actId="20577"/>
+      <pc:docMkLst>
+        <pc:docMk/>
+      </pc:docMkLst>
+      <pc:sldChg chg="modSp mod">
+        <pc:chgData name="Martin Garrad" userId="29fa8137-b5d4-4adf-94e3-55aca812c4da" providerId="ADAL" clId="{7F7E35A6-1589-9547-9539-0C50FDBE5FEE}" dt="2025-08-11T13:05:20.700" v="15" actId="20577"/>
+        <pc:sldMkLst>
+          <pc:docMk/>
+          <pc:sldMk cId="4188381686" sldId="287"/>
+        </pc:sldMkLst>
+        <pc:spChg chg="mod">
+          <ac:chgData name="Martin Garrad" userId="29fa8137-b5d4-4adf-94e3-55aca812c4da" providerId="ADAL" clId="{7F7E35A6-1589-9547-9539-0C50FDBE5FEE}" dt="2025-08-11T13:05:20.700" v="15" actId="20577"/>
+          <ac:spMkLst>
+            <pc:docMk/>
+            <pc:sldMk cId="4188381686" sldId="287"/>
+            <ac:spMk id="9" creationId="{2F472E59-78FD-12DB-1DD0-DB00990D9B88}"/>
+          </ac:spMkLst>
+        </pc:spChg>
+      </pc:sldChg>
+    </pc:docChg>
+  </pc:docChgLst>
+</pc:chgInfo>
 </file>
 
 <file path=ppt/notesMasters/notesMaster1.xml><?xml version="1.0" encoding="utf-8"?>
@@ -234,7 +268,7 @@
           <a:p>
             <a:fld id="{822FFC1C-5262-4543-9BBE-0C5AA43086FB}" type="datetimeFigureOut">
               <a:rPr lang="en-US" smtClean="0"/>
-              <a:t>8/4/25</a:t>
+              <a:t>8/11/25</a:t>
             </a:fld>
             <a:endParaRPr lang="en-US"/>
           </a:p>
@@ -916,7 +950,7 @@
           <a:p>
             <a:fld id="{12CB69F8-D140-384A-AC86-0BBD87A381F0}" type="datetimeFigureOut">
               <a:rPr lang="en-US" smtClean="0"/>
-              <a:t>8/4/25</a:t>
+              <a:t>8/11/25</a:t>
             </a:fld>
             <a:endParaRPr lang="en-US"/>
           </a:p>
@@ -1116,7 +1150,7 @@
           <a:p>
             <a:fld id="{12CB69F8-D140-384A-AC86-0BBD87A381F0}" type="datetimeFigureOut">
               <a:rPr lang="en-US" smtClean="0"/>
-              <a:t>8/4/25</a:t>
+              <a:t>8/11/25</a:t>
             </a:fld>
             <a:endParaRPr lang="en-US"/>
           </a:p>
@@ -1326,7 +1360,7 @@
           <a:p>
             <a:fld id="{12CB69F8-D140-384A-AC86-0BBD87A381F0}" type="datetimeFigureOut">
               <a:rPr lang="en-US" smtClean="0"/>
-              <a:t>8/4/25</a:t>
+              <a:t>8/11/25</a:t>
             </a:fld>
             <a:endParaRPr lang="en-US"/>
           </a:p>
@@ -1526,7 +1560,7 @@
           <a:p>
             <a:fld id="{12CB69F8-D140-384A-AC86-0BBD87A381F0}" type="datetimeFigureOut">
               <a:rPr lang="en-US" smtClean="0"/>
-              <a:t>8/4/25</a:t>
+              <a:t>8/11/25</a:t>
             </a:fld>
             <a:endParaRPr lang="en-US"/>
           </a:p>
@@ -1802,7 +1836,7 @@
           <a:p>
             <a:fld id="{12CB69F8-D140-384A-AC86-0BBD87A381F0}" type="datetimeFigureOut">
               <a:rPr lang="en-US" smtClean="0"/>
-              <a:t>8/4/25</a:t>
+              <a:t>8/11/25</a:t>
             </a:fld>
             <a:endParaRPr lang="en-US"/>
           </a:p>
@@ -2070,7 +2104,7 @@
           <a:p>
             <a:fld id="{12CB69F8-D140-384A-AC86-0BBD87A381F0}" type="datetimeFigureOut">
               <a:rPr lang="en-US" smtClean="0"/>
-              <a:t>8/4/25</a:t>
+              <a:t>8/11/25</a:t>
             </a:fld>
             <a:endParaRPr lang="en-US"/>
           </a:p>
@@ -2485,7 +2519,7 @@
           <a:p>
             <a:fld id="{12CB69F8-D140-384A-AC86-0BBD87A381F0}" type="datetimeFigureOut">
               <a:rPr lang="en-US" smtClean="0"/>
-              <a:t>8/4/25</a:t>
+              <a:t>8/11/25</a:t>
             </a:fld>
             <a:endParaRPr lang="en-US"/>
           </a:p>
@@ -2627,7 +2661,7 @@
           <a:p>
             <a:fld id="{12CB69F8-D140-384A-AC86-0BBD87A381F0}" type="datetimeFigureOut">
               <a:rPr lang="en-US" smtClean="0"/>
-              <a:t>8/4/25</a:t>
+              <a:t>8/11/25</a:t>
             </a:fld>
             <a:endParaRPr lang="en-US"/>
           </a:p>
@@ -2740,7 +2774,7 @@
           <a:p>
             <a:fld id="{12CB69F8-D140-384A-AC86-0BBD87A381F0}" type="datetimeFigureOut">
               <a:rPr lang="en-US" smtClean="0"/>
-              <a:t>8/4/25</a:t>
+              <a:t>8/11/25</a:t>
             </a:fld>
             <a:endParaRPr lang="en-US"/>
           </a:p>
@@ -3053,7 +3087,7 @@
           <a:p>
             <a:fld id="{12CB69F8-D140-384A-AC86-0BBD87A381F0}" type="datetimeFigureOut">
               <a:rPr lang="en-US" smtClean="0"/>
-              <a:t>8/4/25</a:t>
+              <a:t>8/11/25</a:t>
             </a:fld>
             <a:endParaRPr lang="en-US"/>
           </a:p>
@@ -3342,7 +3376,7 @@
           <a:p>
             <a:fld id="{12CB69F8-D140-384A-AC86-0BBD87A381F0}" type="datetimeFigureOut">
               <a:rPr lang="en-US" smtClean="0"/>
-              <a:t>8/4/25</a:t>
+              <a:t>8/11/25</a:t>
             </a:fld>
             <a:endParaRPr lang="en-US"/>
           </a:p>
@@ -3585,7 +3619,7 @@
           <a:p>
             <a:fld id="{12CB69F8-D140-384A-AC86-0BBD87A381F0}" type="datetimeFigureOut">
               <a:rPr lang="en-US" smtClean="0"/>
-              <a:t>8/4/25</a:t>
+              <a:t>8/11/25</a:t>
             </a:fld>
             <a:endParaRPr lang="en-US"/>
           </a:p>
@@ -12841,7 +12875,7 @@
             </a:pPr>
             <a:r>
               <a:rPr lang="en-US" sz="2800" dirty="0"/>
-              <a:t>Write some computer code that has encodes this set of sequences in a format the CPU can understand.</a:t>
+              <a:t>Write some computer code that encodes this set of instructions in a format the CPU can understand.</a:t>
             </a:r>
           </a:p>
         </p:txBody>

</xml_diff>

<commit_message>
Minor updates to a few lab sheets
</commit_message>
<xml_diff>
--- a/Week_1_variables_operators_and_algorithms/Seminar_algorithms/seminar1_algorithms.pptx
+++ b/Week_1_variables_operators_and_algorithms/Seminar_algorithms/seminar1_algorithms.pptx
@@ -162,7 +162,7 @@
   <pc:docChgLst>
     <pc:chgData name="Martin Garrad" userId="29fa8137-b5d4-4adf-94e3-55aca812c4da" providerId="ADAL" clId="{7F7E35A6-1589-9547-9539-0C50FDBE5FEE}"/>
     <pc:docChg chg="modSld">
-      <pc:chgData name="Martin Garrad" userId="29fa8137-b5d4-4adf-94e3-55aca812c4da" providerId="ADAL" clId="{7F7E35A6-1589-9547-9539-0C50FDBE5FEE}" dt="2025-08-11T13:05:20.700" v="15" actId="20577"/>
+      <pc:chgData name="Martin Garrad" userId="29fa8137-b5d4-4adf-94e3-55aca812c4da" providerId="ADAL" clId="{7F7E35A6-1589-9547-9539-0C50FDBE5FEE}" dt="2025-08-12T15:39:38.327" v="19" actId="20577"/>
       <pc:docMkLst>
         <pc:docMk/>
       </pc:docMkLst>
@@ -178,6 +178,21 @@
             <pc:docMk/>
             <pc:sldMk cId="4188381686" sldId="287"/>
             <ac:spMk id="9" creationId="{2F472E59-78FD-12DB-1DD0-DB00990D9B88}"/>
+          </ac:spMkLst>
+        </pc:spChg>
+      </pc:sldChg>
+      <pc:sldChg chg="modSp mod">
+        <pc:chgData name="Martin Garrad" userId="29fa8137-b5d4-4adf-94e3-55aca812c4da" providerId="ADAL" clId="{7F7E35A6-1589-9547-9539-0C50FDBE5FEE}" dt="2025-08-12T15:39:38.327" v="19" actId="20577"/>
+        <pc:sldMkLst>
+          <pc:docMk/>
+          <pc:sldMk cId="3809527063" sldId="297"/>
+        </pc:sldMkLst>
+        <pc:spChg chg="mod">
+          <ac:chgData name="Martin Garrad" userId="29fa8137-b5d4-4adf-94e3-55aca812c4da" providerId="ADAL" clId="{7F7E35A6-1589-9547-9539-0C50FDBE5FEE}" dt="2025-08-12T15:39:38.327" v="19" actId="20577"/>
+          <ac:spMkLst>
+            <pc:docMk/>
+            <pc:sldMk cId="3809527063" sldId="297"/>
+            <ac:spMk id="7" creationId="{85C88F60-A86C-E5E3-1EB7-EF66F9C8C3DD}"/>
           </ac:spMkLst>
         </pc:spChg>
       </pc:sldChg>
@@ -792,6 +807,90 @@
     <p:extLst>
       <p:ext uri="{BB962C8B-B14F-4D97-AF65-F5344CB8AC3E}">
         <p14:creationId xmlns:p14="http://schemas.microsoft.com/office/powerpoint/2010/main" val="52403515"/>
+      </p:ext>
+    </p:extLst>
+  </p:cSld>
+  <p:clrMapOvr>
+    <a:masterClrMapping/>
+  </p:clrMapOvr>
+</p:notes>
+</file>
+
+<file path=ppt/notesSlides/notesSlide4.xml><?xml version="1.0" encoding="utf-8"?>
+<p:notes xmlns:a="http://schemas.openxmlformats.org/drawingml/2006/main" xmlns:r="http://schemas.openxmlformats.org/officeDocument/2006/relationships" xmlns:p="http://schemas.openxmlformats.org/presentationml/2006/main">
+  <p:cSld>
+    <p:spTree>
+      <p:nvGrpSpPr>
+        <p:cNvPr id="1" name=""/>
+        <p:cNvGrpSpPr/>
+        <p:nvPr/>
+      </p:nvGrpSpPr>
+      <p:grpSpPr>
+        <a:xfrm>
+          <a:off x="0" y="0"/>
+          <a:ext cx="0" cy="0"/>
+          <a:chOff x="0" y="0"/>
+          <a:chExt cx="0" cy="0"/>
+        </a:xfrm>
+      </p:grpSpPr>
+      <p:sp>
+        <p:nvSpPr>
+          <p:cNvPr id="2" name="Slide Image Placeholder 1"/>
+          <p:cNvSpPr>
+            <a:spLocks noGrp="1" noRot="1" noChangeAspect="1"/>
+          </p:cNvSpPr>
+          <p:nvPr>
+            <p:ph type="sldImg"/>
+          </p:nvPr>
+        </p:nvSpPr>
+        <p:spPr/>
+      </p:sp>
+      <p:sp>
+        <p:nvSpPr>
+          <p:cNvPr id="3" name="Notes Placeholder 2"/>
+          <p:cNvSpPr>
+            <a:spLocks noGrp="1"/>
+          </p:cNvSpPr>
+          <p:nvPr>
+            <p:ph type="body" idx="1"/>
+          </p:nvPr>
+        </p:nvSpPr>
+        <p:spPr/>
+        <p:txBody>
+          <a:bodyPr/>
+          <a:lstStyle/>
+          <a:p>
+            <a:endParaRPr lang="en-US" dirty="0"/>
+          </a:p>
+        </p:txBody>
+      </p:sp>
+      <p:sp>
+        <p:nvSpPr>
+          <p:cNvPr id="4" name="Slide Number Placeholder 3"/>
+          <p:cNvSpPr>
+            <a:spLocks noGrp="1"/>
+          </p:cNvSpPr>
+          <p:nvPr>
+            <p:ph type="sldNum" sz="quarter" idx="5"/>
+          </p:nvPr>
+        </p:nvSpPr>
+        <p:spPr/>
+        <p:txBody>
+          <a:bodyPr/>
+          <a:lstStyle/>
+          <a:p>
+            <a:fld id="{CB69EED5-87EA-774C-9B10-AE639F696C4C}" type="slidenum">
+              <a:rPr lang="en-US" smtClean="0"/>
+              <a:t>35</a:t>
+            </a:fld>
+            <a:endParaRPr lang="en-US"/>
+          </a:p>
+        </p:txBody>
+      </p:sp>
+    </p:spTree>
+    <p:extLst>
+      <p:ext uri="{BB962C8B-B14F-4D97-AF65-F5344CB8AC3E}">
+        <p14:creationId xmlns:p14="http://schemas.microsoft.com/office/powerpoint/2010/main" val="523352997"/>
       </p:ext>
     </p:extLst>
   </p:cSld>
@@ -13934,7 +14033,7 @@
           <p:nvPr/>
         </p:nvPicPr>
         <p:blipFill>
-          <a:blip r:embed="rId2"/>
+          <a:blip r:embed="rId3"/>
           <a:stretch>
             <a:fillRect/>
           </a:stretch>
@@ -13964,7 +14063,7 @@
           <p:nvPr/>
         </p:nvPicPr>
         <p:blipFill>
-          <a:blip r:embed="rId3"/>
+          <a:blip r:embed="rId4"/>
           <a:stretch>
             <a:fillRect/>
           </a:stretch>
@@ -13994,7 +14093,7 @@
           <p:nvPr/>
         </p:nvPicPr>
         <p:blipFill>
-          <a:blip r:embed="rId4"/>
+          <a:blip r:embed="rId5"/>
           <a:stretch>
             <a:fillRect/>
           </a:stretch>
@@ -14055,11 +14154,19 @@
             </a:r>
             <a:r>
               <a:rPr lang="en-US" sz="2800" dirty="0"/>
-              <a:t> what is and isn’t valid Python syntax. A second main job is to understand the </a:t>
+              <a:t> what is and isn’t valid Python </a:t>
             </a:r>
             <a:r>
               <a:rPr lang="en-US" sz="2800" i="1" dirty="0"/>
-              <a:t>semantics </a:t>
+              <a:t>syntax</a:t>
+            </a:r>
+            <a:r>
+              <a:rPr lang="en-US" sz="2800" dirty="0"/>
+              <a:t>. A second main job is to understand the </a:t>
+            </a:r>
+            <a:r>
+              <a:rPr lang="en-US" sz="2800" i="1" dirty="0"/>
+              <a:t>semantics of </a:t>
             </a:r>
             <a:r>
               <a:rPr lang="en-US" sz="2800" dirty="0"/>

</xml_diff>